<commit_message>
Add a bullet on EPC.
</commit_message>
<xml_diff>
--- a/nyu_wireless_anirudh.pptx
+++ b/nyu_wireless_anirudh.pptx
@@ -229,7 +229,7 @@
           <a:p>
             <a:fld id="{F9C7B9F6-97F7-436C-AE99-7DC514F72812}" type="datetimeFigureOut">
               <a:rPr lang="en-US" smtClean="0"/>
-              <a:t>4/24/18</a:t>
+              <a:t>1/23/19</a:t>
             </a:fld>
             <a:endParaRPr lang="en-US"/>
           </a:p>
@@ -1567,7 +1567,7 @@
           <a:p>
             <a:fld id="{21F27DEF-D704-4509-8BF6-90F2BA4AB2EF}" type="datetimeFigureOut">
               <a:rPr lang="en-US" smtClean="0"/>
-              <a:t>4/24/18</a:t>
+              <a:t>1/23/19</a:t>
             </a:fld>
             <a:endParaRPr lang="en-US"/>
           </a:p>
@@ -1735,7 +1735,7 @@
           <a:p>
             <a:fld id="{21F27DEF-D704-4509-8BF6-90F2BA4AB2EF}" type="datetimeFigureOut">
               <a:rPr lang="en-US" smtClean="0"/>
-              <a:t>4/24/18</a:t>
+              <a:t>1/23/19</a:t>
             </a:fld>
             <a:endParaRPr lang="en-US"/>
           </a:p>
@@ -1913,7 +1913,7 @@
           <a:p>
             <a:fld id="{21F27DEF-D704-4509-8BF6-90F2BA4AB2EF}" type="datetimeFigureOut">
               <a:rPr lang="en-US" smtClean="0"/>
-              <a:t>4/24/18</a:t>
+              <a:t>1/23/19</a:t>
             </a:fld>
             <a:endParaRPr lang="en-US"/>
           </a:p>
@@ -2113,7 +2113,7 @@
           <a:p>
             <a:fld id="{21F27DEF-D704-4509-8BF6-90F2BA4AB2EF}" type="datetimeFigureOut">
               <a:rPr lang="en-US" smtClean="0"/>
-              <a:t>4/24/18</a:t>
+              <a:t>1/23/19</a:t>
             </a:fld>
             <a:endParaRPr lang="en-US"/>
           </a:p>
@@ -2338,7 +2338,7 @@
           <a:p>
             <a:fld id="{21F27DEF-D704-4509-8BF6-90F2BA4AB2EF}" type="datetimeFigureOut">
               <a:rPr lang="en-US" smtClean="0"/>
-              <a:t>4/24/18</a:t>
+              <a:t>1/23/19</a:t>
             </a:fld>
             <a:endParaRPr lang="en-US" dirty="0"/>
           </a:p>
@@ -2544,7 +2544,7 @@
           <a:p>
             <a:fld id="{21F27DEF-D704-4509-8BF6-90F2BA4AB2EF}" type="datetimeFigureOut">
               <a:rPr lang="en-US" smtClean="0"/>
-              <a:t>4/24/18</a:t>
+              <a:t>1/23/19</a:t>
             </a:fld>
             <a:endParaRPr lang="en-US"/>
           </a:p>
@@ -2908,7 +2908,7 @@
           <a:p>
             <a:fld id="{21F27DEF-D704-4509-8BF6-90F2BA4AB2EF}" type="datetimeFigureOut">
               <a:rPr lang="en-US" smtClean="0"/>
-              <a:t>4/24/18</a:t>
+              <a:t>1/23/19</a:t>
             </a:fld>
             <a:endParaRPr lang="en-US"/>
           </a:p>
@@ -3025,7 +3025,7 @@
           <a:p>
             <a:fld id="{21F27DEF-D704-4509-8BF6-90F2BA4AB2EF}" type="datetimeFigureOut">
               <a:rPr lang="en-US" smtClean="0"/>
-              <a:t>4/24/18</a:t>
+              <a:t>1/23/19</a:t>
             </a:fld>
             <a:endParaRPr lang="en-US"/>
           </a:p>
@@ -3097,7 +3097,7 @@
           <a:p>
             <a:fld id="{21F27DEF-D704-4509-8BF6-90F2BA4AB2EF}" type="datetimeFigureOut">
               <a:rPr lang="en-US" smtClean="0"/>
-              <a:t>4/24/18</a:t>
+              <a:t>1/23/19</a:t>
             </a:fld>
             <a:endParaRPr lang="en-US"/>
           </a:p>
@@ -3372,7 +3372,7 @@
           <a:p>
             <a:fld id="{21F27DEF-D704-4509-8BF6-90F2BA4AB2EF}" type="datetimeFigureOut">
               <a:rPr lang="en-US" smtClean="0"/>
-              <a:t>4/24/18</a:t>
+              <a:t>1/23/19</a:t>
             </a:fld>
             <a:endParaRPr lang="en-US"/>
           </a:p>
@@ -3624,7 +3624,7 @@
           <a:p>
             <a:fld id="{21F27DEF-D704-4509-8BF6-90F2BA4AB2EF}" type="datetimeFigureOut">
               <a:rPr lang="en-US" smtClean="0"/>
-              <a:t>4/24/18</a:t>
+              <a:t>1/23/19</a:t>
             </a:fld>
             <a:endParaRPr lang="en-US"/>
           </a:p>
@@ -3835,7 +3835,7 @@
           <a:p>
             <a:fld id="{21F27DEF-D704-4509-8BF6-90F2BA4AB2EF}" type="datetimeFigureOut">
               <a:rPr lang="en-US" smtClean="0"/>
-              <a:t>4/24/18</a:t>
+              <a:t>1/23/19</a:t>
             </a:fld>
             <a:endParaRPr lang="en-US"/>
           </a:p>
@@ -4258,7 +4258,7 @@
         </p:spPr>
         <p:txBody>
           <a:bodyPr>
-            <a:normAutofit/>
+            <a:normAutofit fontScale="90000"/>
           </a:bodyPr>
           <a:lstStyle/>
           <a:p>
@@ -4279,6 +4279,18 @@
               </a:rPr>
               <a:t>network infrastructure</a:t>
             </a:r>
+            <a:br>
+              <a:rPr lang="en-US" dirty="0">
+                <a:latin typeface="Gadugi" panose="020B0502040204020203" pitchFamily="34" charset="0"/>
+              </a:rPr>
+            </a:br>
+            <a:r>
+              <a:rPr lang="en-US" dirty="0"/>
+              <a:t>for future wireless communications</a:t>
+            </a:r>
+            <a:endParaRPr lang="en-US" dirty="0">
+              <a:latin typeface="Gadugi" panose="020B0502040204020203" pitchFamily="34" charset="0"/>
+            </a:endParaRPr>
           </a:p>
         </p:txBody>
       </p:sp>
@@ -5254,13 +5266,8 @@
           <a:p>
             <a:r>
               <a:rPr lang="en-US" dirty="0"/>
-              <a:t>We are demanding more from routers: ACLs, tunnels, measurement </a:t>
+              <a:t>Demanding more from our network’s routers: ACLs, tunnels, measurement, etc.</a:t>
             </a:r>
-            <a:r>
-              <a:rPr lang="en-US" dirty="0" err="1"/>
-              <a:t>etc</a:t>
-            </a:r>
-            <a:endParaRPr lang="en-US" dirty="0"/>
           </a:p>
           <a:p>
             <a:r>
@@ -14796,22 +14803,25 @@
               <a:rPr lang="en-US" dirty="0">
                 <a:latin typeface="Gadugi" panose="020B0502040204020203" pitchFamily="34" charset="0"/>
               </a:rPr>
-              <a:t> ideas from Domino are now in P4, an emerging language for programmable network devices</a:t>
+              <a:t> ideas from Domino/PIFO now in P4, an emerging language for programmable network devices</a:t>
             </a:r>
           </a:p>
           <a:p>
+            <a:pPr marL="0" indent="0">
+              <a:buNone/>
+            </a:pPr>
             <a:endParaRPr lang="en-US" dirty="0"/>
           </a:p>
           <a:p>
             <a:r>
               <a:rPr lang="en-US" dirty="0"/>
-              <a:t>Industry interest </a:t>
+              <a:t>Industry interest in </a:t>
             </a:r>
             <a:r>
               <a:rPr lang="en-US" dirty="0">
                 <a:latin typeface="Gadugi" panose="020B0502040204020203" pitchFamily="34" charset="0"/>
               </a:rPr>
-              <a:t>in PIFOs, Domino’s compiler techniques</a:t>
+              <a:t>Domino’s compiler techniques</a:t>
             </a:r>
           </a:p>
           <a:p>
@@ -15013,7 +15023,7 @@
           <a:p>
             <a:r>
               <a:rPr lang="en-US" dirty="0"/>
-              <a:t>How should programmable routers be used?</a:t>
+              <a:t>How should programmable networks  be used?</a:t>
             </a:r>
           </a:p>
         </p:txBody>
@@ -15042,13 +15052,13 @@
         </p:spPr>
         <p:txBody>
           <a:bodyPr>
-            <a:normAutofit lnSpcReduction="10000"/>
+            <a:normAutofit fontScale="92500"/>
           </a:bodyPr>
           <a:lstStyle/>
           <a:p>
             <a:r>
               <a:rPr lang="en-US" sz="3200" dirty="0"/>
-              <a:t>Let’s assume fast and programmable routers can be built.</a:t>
+              <a:t>Assume fast and programmable network equipment can be built.</a:t>
             </a:r>
           </a:p>
           <a:p>
@@ -15080,7 +15090,15 @@
           <a:p>
             <a:r>
               <a:rPr lang="en-US" sz="3200" dirty="0"/>
-              <a:t>Evaluate using a testbed with a high-speed programmable switch from Barefoot Networks</a:t>
+              <a:t>Evaluate these choices using actual programmable network devices (e.g., </a:t>
+            </a:r>
+            <a:r>
+              <a:rPr lang="en-US" sz="3200" dirty="0" err="1"/>
+              <a:t>SmartNICs</a:t>
+            </a:r>
+            <a:r>
+              <a:rPr lang="en-US" sz="3200" dirty="0"/>
+              <a:t>, programmable access points, routers, middleboxes, etc.)</a:t>
             </a:r>
           </a:p>
         </p:txBody>
@@ -15412,8 +15430,12 @@
           <a:lstStyle/>
           <a:p>
             <a:r>
+              <a:rPr lang="en-US" dirty="0"/>
+              <a:t>Future: </a:t>
+            </a:r>
+            <a:r>
               <a:rPr lang="en-US" dirty="0" err="1"/>
-              <a:t>Hardware+software</a:t>
+              <a:t>hardware+software</a:t>
             </a:r>
             <a:r>
               <a:rPr lang="en-US" dirty="0"/>
@@ -15453,19 +15475,14 @@
             </a:r>
             <a:r>
               <a:rPr lang="en-US" dirty="0"/>
-              <a:t> and </a:t>
+              <a:t> and cellular networks</a:t>
             </a:r>
-            <a:r>
-              <a:rPr lang="en-US"/>
-              <a:t>cellular networks</a:t>
-            </a:r>
-            <a:endParaRPr lang="en-US" dirty="0"/>
           </a:p>
           <a:p>
             <a:pPr lvl="1"/>
             <a:r>
               <a:rPr lang="en-US" dirty="0"/>
-              <a:t>Especially in the context of the physical layer</a:t>
+              <a:t>Especially in the context of signal processing in the physical layer</a:t>
             </a:r>
           </a:p>
           <a:p>
@@ -15481,7 +15498,17 @@
             <a:pPr lvl="1"/>
             <a:r>
               <a:rPr lang="en-US" dirty="0"/>
-              <a:t>Splitting the wireless stack between the host processor and an accelerator</a:t>
+              <a:t>Splitting the wireless stack between a host processor and an accelerator/FPGA</a:t>
+            </a:r>
+          </a:p>
+          <a:p>
+            <a:pPr lvl="1"/>
+            <a:endParaRPr lang="en-US" dirty="0"/>
+          </a:p>
+          <a:p>
+            <a:r>
+              <a:rPr lang="en-US" dirty="0"/>
+              <a:t>Programmability for the evolved packet core</a:t>
             </a:r>
           </a:p>
         </p:txBody>
@@ -15680,6 +15707,55 @@
                                           <p:spTgt spid="3">
                                             <p:txEl>
                                               <p:pRg st="4" end="4"/>
+                                            </p:txEl>
+                                          </p:spTgt>
+                                        </p:tgtEl>
+                                        <p:attrNameLst>
+                                          <p:attrName>style.visibility</p:attrName>
+                                        </p:attrNameLst>
+                                      </p:cBhvr>
+                                      <p:to>
+                                        <p:strVal val="visible"/>
+                                      </p:to>
+                                    </p:set>
+                                  </p:childTnLst>
+                                </p:cTn>
+                              </p:par>
+                            </p:childTnLst>
+                          </p:cTn>
+                        </p:par>
+                      </p:childTnLst>
+                    </p:cTn>
+                  </p:par>
+                  <p:par>
+                    <p:cTn id="19" fill="hold">
+                      <p:stCondLst>
+                        <p:cond delay="indefinite"/>
+                      </p:stCondLst>
+                      <p:childTnLst>
+                        <p:par>
+                          <p:cTn id="20" fill="hold">
+                            <p:stCondLst>
+                              <p:cond delay="0"/>
+                            </p:stCondLst>
+                            <p:childTnLst>
+                              <p:par>
+                                <p:cTn id="21" presetID="1" presetClass="entr" presetSubtype="0" fill="hold" nodeType="clickEffect">
+                                  <p:stCondLst>
+                                    <p:cond delay="0"/>
+                                  </p:stCondLst>
+                                  <p:childTnLst>
+                                    <p:set>
+                                      <p:cBhvr>
+                                        <p:cTn id="22" dur="1" fill="hold">
+                                          <p:stCondLst>
+                                            <p:cond delay="0"/>
+                                          </p:stCondLst>
+                                        </p:cTn>
+                                        <p:tgtEl>
+                                          <p:spTgt spid="3">
+                                            <p:txEl>
+                                              <p:pRg st="6" end="6"/>
                                             </p:txEl>
                                           </p:spTgt>
                                         </p:tgtEl>

</xml_diff>

<commit_message>
Add more use cases.
</commit_message>
<xml_diff>
--- a/nyu_wireless_anirudh.pptx
+++ b/nyu_wireless_anirudh.pptx
@@ -5,7 +5,7 @@
     <p:sldMasterId id="2147483648" r:id="rId1"/>
   </p:sldMasterIdLst>
   <p:notesMasterIdLst>
-    <p:notesMasterId r:id="rId10"/>
+    <p:notesMasterId r:id="rId11"/>
   </p:notesMasterIdLst>
   <p:sldIdLst>
     <p:sldId id="256" r:id="rId2"/>
@@ -16,6 +16,7 @@
     <p:sldId id="358" r:id="rId7"/>
     <p:sldId id="635" r:id="rId8"/>
     <p:sldId id="638" r:id="rId9"/>
+    <p:sldId id="639" r:id="rId10"/>
   </p:sldIdLst>
   <p:sldSz cx="12192000" cy="6858000"/>
   <p:notesSz cx="6858000" cy="9144000"/>
@@ -4936,8 +4937,8 @@
         </p:nvSpPr>
         <p:spPr>
           <a:xfrm>
-            <a:off x="1714897" y="6108226"/>
-            <a:ext cx="8762207" cy="553998"/>
+            <a:off x="1678797" y="6108226"/>
+            <a:ext cx="8938601" cy="553998"/>
           </a:xfrm>
           <a:prstGeom prst="rect">
             <a:avLst/>
@@ -4954,7 +4955,7 @@
               <a:rPr lang="en-US" sz="3000" dirty="0">
                 <a:latin typeface="Gadugi" panose="020B0502040204020203" pitchFamily="34" charset="0"/>
               </a:rPr>
-              <a:t>Simple routers; most functionality resides on end hosts</a:t>
+              <a:t>Simple network; most functionality resides on end hosts</a:t>
             </a:r>
           </a:p>
         </p:txBody>
@@ -6796,64 +6797,6 @@
             <a:endParaRPr lang="en-US" dirty="0">
               <a:latin typeface="Gadugi" panose="020B0502040204020203" pitchFamily="34" charset="0"/>
             </a:endParaRPr>
-          </a:p>
-        </p:txBody>
-      </p:sp>
-      <p:sp>
-        <p:nvSpPr>
-          <p:cNvPr id="3" name="Content Placeholder 2"/>
-          <p:cNvSpPr>
-            <a:spLocks noGrp="1"/>
-          </p:cNvSpPr>
-          <p:nvPr>
-            <p:ph idx="1"/>
-          </p:nvPr>
-        </p:nvSpPr>
-        <p:spPr>
-          <a:xfrm>
-            <a:off x="838200" y="1825624"/>
-            <a:ext cx="10934700" cy="4879976"/>
-          </a:xfrm>
-        </p:spPr>
-        <p:txBody>
-          <a:bodyPr>
-            <a:normAutofit/>
-          </a:bodyPr>
-          <a:lstStyle/>
-          <a:p>
-            <a:r>
-              <a:rPr lang="en-US" dirty="0"/>
-              <a:t>We are demanding more from routers: ACLs, tunnels, measurement </a:t>
-            </a:r>
-            <a:r>
-              <a:rPr lang="en-US" dirty="0" err="1"/>
-              <a:t>etc</a:t>
-            </a:r>
-            <a:endParaRPr lang="en-US" dirty="0"/>
-          </a:p>
-          <a:p>
-            <a:r>
-              <a:rPr lang="en-US" dirty="0"/>
-              <a:t>Yet, the fastest routers have historically been fixed-function</a:t>
-            </a:r>
-          </a:p>
-          <a:p>
-            <a:r>
-              <a:rPr lang="en-US" dirty="0"/>
-              <a:t>Rate of innovation exceeds our ability to get things into routers</a:t>
-            </a:r>
-          </a:p>
-          <a:p>
-            <a:endParaRPr lang="en-US" dirty="0"/>
-          </a:p>
-          <a:p>
-            <a:endParaRPr lang="en-US" dirty="0"/>
-          </a:p>
-          <a:p>
-            <a:endParaRPr lang="en-US" dirty="0"/>
-          </a:p>
-          <a:p>
-            <a:endParaRPr lang="en-US" dirty="0"/>
           </a:p>
         </p:txBody>
       </p:sp>
@@ -8312,6 +8255,68 @@
           </p:txBody>
         </p:sp>
       </p:grpSp>
+      <p:sp>
+        <p:nvSpPr>
+          <p:cNvPr id="40" name="Content Placeholder 2">
+            <a:extLst>
+              <a:ext uri="{FF2B5EF4-FFF2-40B4-BE49-F238E27FC236}">
+                <a16:creationId xmlns:a16="http://schemas.microsoft.com/office/drawing/2014/main" id="{13DDFD1C-94EC-2B47-84D4-B504044A9C0E}"/>
+              </a:ext>
+            </a:extLst>
+          </p:cNvPr>
+          <p:cNvSpPr>
+            <a:spLocks noGrp="1"/>
+          </p:cNvSpPr>
+          <p:nvPr>
+            <p:ph idx="1"/>
+          </p:nvPr>
+        </p:nvSpPr>
+        <p:spPr>
+          <a:xfrm>
+            <a:off x="838200" y="1825624"/>
+            <a:ext cx="10934700" cy="4879976"/>
+          </a:xfrm>
+        </p:spPr>
+        <p:txBody>
+          <a:bodyPr>
+            <a:normAutofit/>
+          </a:bodyPr>
+          <a:lstStyle/>
+          <a:p>
+            <a:r>
+              <a:rPr lang="en-US" dirty="0"/>
+              <a:t>Demanding more from our network’s routers: ACLs, tunnels, measurement, etc.</a:t>
+            </a:r>
+          </a:p>
+          <a:p>
+            <a:r>
+              <a:rPr lang="en-US" dirty="0"/>
+              <a:t>Yet, the fastest routers have historically been fixed-function</a:t>
+            </a:r>
+          </a:p>
+          <a:p>
+            <a:r>
+              <a:rPr lang="en-US" dirty="0"/>
+              <a:t>Rate of innovation exceeds our ability to get things into routers</a:t>
+            </a:r>
+          </a:p>
+          <a:p>
+            <a:endParaRPr lang="en-US" dirty="0"/>
+          </a:p>
+          <a:p>
+            <a:endParaRPr lang="en-US" dirty="0"/>
+          </a:p>
+          <a:p>
+            <a:endParaRPr lang="en-US" dirty="0"/>
+          </a:p>
+          <a:p>
+            <a:endParaRPr lang="en-US" dirty="0"/>
+          </a:p>
+          <a:p>
+            <a:endParaRPr lang="en-US" dirty="0"/>
+          </a:p>
+        </p:txBody>
+      </p:sp>
     </p:spTree>
     <p:extLst>
       <p:ext uri="{BB962C8B-B14F-4D97-AF65-F5344CB8AC3E}">
@@ -15098,7 +15103,7 @@
             </a:r>
             <a:r>
               <a:rPr lang="en-US" sz="3200" dirty="0"/>
-              <a:t>, programmable access points, routers, middleboxes, etc.)</a:t>
+              <a:t>, programmable access points, routers, middleboxes, etc.).</a:t>
             </a:r>
           </a:p>
         </p:txBody>
@@ -15431,15 +15436,7 @@
           <a:p>
             <a:r>
               <a:rPr lang="en-US" dirty="0"/>
-              <a:t>Future: </a:t>
-            </a:r>
-            <a:r>
-              <a:rPr lang="en-US" dirty="0" err="1"/>
-              <a:t>hardware+software</a:t>
-            </a:r>
-            <a:r>
-              <a:rPr lang="en-US" dirty="0"/>
-              <a:t> for wireless</a:t>
+              <a:t>Future: hardware and software for wireless</a:t>
             </a:r>
           </a:p>
         </p:txBody>
@@ -15462,54 +15459,83 @@
         </p:nvSpPr>
         <p:spPr/>
         <p:txBody>
-          <a:bodyPr/>
+          <a:bodyPr>
+            <a:noAutofit/>
+          </a:bodyPr>
           <a:lstStyle/>
           <a:p>
+            <a:r>
+              <a:rPr lang="en-US" sz="3200" dirty="0"/>
+              <a:t>Physical-layer packet processing in both </a:t>
+            </a:r>
+            <a:r>
+              <a:rPr lang="en-US" sz="3200" dirty="0" err="1"/>
+              <a:t>WiFi</a:t>
+            </a:r>
+            <a:r>
+              <a:rPr lang="en-US" sz="3200" dirty="0"/>
+              <a:t> and cellular networks</a:t>
+            </a:r>
+          </a:p>
+          <a:p>
+            <a:pPr lvl="1"/>
+            <a:r>
+              <a:rPr lang="en-US" sz="2800" dirty="0"/>
+              <a:t>Make signal processing programmable and efficient.</a:t>
+            </a:r>
+          </a:p>
+          <a:p>
+            <a:r>
+              <a:rPr lang="en-US" sz="3200" dirty="0"/>
+              <a:t>Use cases:</a:t>
+            </a:r>
+          </a:p>
+          <a:p>
+            <a:pPr lvl="1"/>
             <a:r>
               <a:rPr lang="en-US" dirty="0"/>
-              <a:t>Significant packet processing in both </a:t>
+              <a:t>Beamforming</a:t>
+            </a:r>
+          </a:p>
+          <a:p>
+            <a:pPr lvl="1"/>
+            <a:r>
+              <a:rPr lang="en-US" dirty="0"/>
+              <a:t>Bit-rate adaptation</a:t>
+            </a:r>
+          </a:p>
+          <a:p>
+            <a:pPr lvl="1"/>
+            <a:r>
+              <a:rPr lang="en-US" dirty="0"/>
+              <a:t>Localization</a:t>
+            </a:r>
+          </a:p>
+          <a:p>
+            <a:pPr lvl="1"/>
+            <a:r>
+              <a:rPr lang="en-US" dirty="0"/>
+              <a:t>Beam alignment</a:t>
+            </a:r>
+          </a:p>
+          <a:p>
+            <a:pPr lvl="1"/>
+            <a:r>
+              <a:rPr lang="en-US" dirty="0"/>
+              <a:t>Spectrum sensing</a:t>
+            </a:r>
+          </a:p>
+          <a:p>
+            <a:pPr lvl="1"/>
+            <a:r>
+              <a:rPr lang="en-US" dirty="0"/>
+              <a:t>Activity detection using </a:t>
             </a:r>
             <a:r>
               <a:rPr lang="en-US" dirty="0" err="1"/>
               <a:t>WiFi</a:t>
             </a:r>
-            <a:r>
-              <a:rPr lang="en-US" dirty="0"/>
-              <a:t> and cellular networks</a:t>
-            </a:r>
-          </a:p>
-          <a:p>
-            <a:pPr lvl="1"/>
-            <a:r>
-              <a:rPr lang="en-US" dirty="0"/>
-              <a:t>Especially in the context of signal processing in the physical layer</a:t>
-            </a:r>
-          </a:p>
-          <a:p>
             <a:endParaRPr lang="en-US" dirty="0"/>
-          </a:p>
-          <a:p>
-            <a:r>
-              <a:rPr lang="en-US" dirty="0"/>
-              <a:t>Designing hardware accelerators for emerging technologies (e.g., 5G)</a:t>
-            </a:r>
-          </a:p>
-          <a:p>
-            <a:pPr lvl="1"/>
-            <a:r>
-              <a:rPr lang="en-US" dirty="0"/>
-              <a:t>Splitting the wireless stack between a host processor and an accelerator/FPGA</a:t>
-            </a:r>
-          </a:p>
-          <a:p>
-            <a:pPr lvl="1"/>
-            <a:endParaRPr lang="en-US" dirty="0"/>
-          </a:p>
-          <a:p>
-            <a:r>
-              <a:rPr lang="en-US" dirty="0"/>
-              <a:t>Programmability for the evolved packet core</a:t>
-            </a:r>
           </a:p>
         </p:txBody>
       </p:sp>
@@ -15657,7 +15683,7 @@
                                         <p:tgtEl>
                                           <p:spTgt spid="3">
                                             <p:txEl>
-                                              <p:pRg st="3" end="3"/>
+                                              <p:pRg st="2" end="2"/>
                                             </p:txEl>
                                           </p:spTgt>
                                         </p:tgtEl>
@@ -15706,7 +15732,7 @@
                                         <p:tgtEl>
                                           <p:spTgt spid="3">
                                             <p:txEl>
-                                              <p:pRg st="4" end="4"/>
+                                              <p:pRg st="3" end="3"/>
                                             </p:txEl>
                                           </p:spTgt>
                                         </p:tgtEl>
@@ -15755,7 +15781,486 @@
                                         <p:tgtEl>
                                           <p:spTgt spid="3">
                                             <p:txEl>
+                                              <p:pRg st="4" end="4"/>
+                                            </p:txEl>
+                                          </p:spTgt>
+                                        </p:tgtEl>
+                                        <p:attrNameLst>
+                                          <p:attrName>style.visibility</p:attrName>
+                                        </p:attrNameLst>
+                                      </p:cBhvr>
+                                      <p:to>
+                                        <p:strVal val="visible"/>
+                                      </p:to>
+                                    </p:set>
+                                  </p:childTnLst>
+                                </p:cTn>
+                              </p:par>
+                            </p:childTnLst>
+                          </p:cTn>
+                        </p:par>
+                      </p:childTnLst>
+                    </p:cTn>
+                  </p:par>
+                  <p:par>
+                    <p:cTn id="23" fill="hold">
+                      <p:stCondLst>
+                        <p:cond delay="indefinite"/>
+                      </p:stCondLst>
+                      <p:childTnLst>
+                        <p:par>
+                          <p:cTn id="24" fill="hold">
+                            <p:stCondLst>
+                              <p:cond delay="0"/>
+                            </p:stCondLst>
+                            <p:childTnLst>
+                              <p:par>
+                                <p:cTn id="25" presetID="1" presetClass="entr" presetSubtype="0" fill="hold" nodeType="clickEffect">
+                                  <p:stCondLst>
+                                    <p:cond delay="0"/>
+                                  </p:stCondLst>
+                                  <p:childTnLst>
+                                    <p:set>
+                                      <p:cBhvr>
+                                        <p:cTn id="26" dur="1" fill="hold">
+                                          <p:stCondLst>
+                                            <p:cond delay="0"/>
+                                          </p:stCondLst>
+                                        </p:cTn>
+                                        <p:tgtEl>
+                                          <p:spTgt spid="3">
+                                            <p:txEl>
+                                              <p:pRg st="5" end="5"/>
+                                            </p:txEl>
+                                          </p:spTgt>
+                                        </p:tgtEl>
+                                        <p:attrNameLst>
+                                          <p:attrName>style.visibility</p:attrName>
+                                        </p:attrNameLst>
+                                      </p:cBhvr>
+                                      <p:to>
+                                        <p:strVal val="visible"/>
+                                      </p:to>
+                                    </p:set>
+                                  </p:childTnLst>
+                                </p:cTn>
+                              </p:par>
+                            </p:childTnLst>
+                          </p:cTn>
+                        </p:par>
+                      </p:childTnLst>
+                    </p:cTn>
+                  </p:par>
+                  <p:par>
+                    <p:cTn id="27" fill="hold">
+                      <p:stCondLst>
+                        <p:cond delay="indefinite"/>
+                      </p:stCondLst>
+                      <p:childTnLst>
+                        <p:par>
+                          <p:cTn id="28" fill="hold">
+                            <p:stCondLst>
+                              <p:cond delay="0"/>
+                            </p:stCondLst>
+                            <p:childTnLst>
+                              <p:par>
+                                <p:cTn id="29" presetID="1" presetClass="entr" presetSubtype="0" fill="hold" nodeType="clickEffect">
+                                  <p:stCondLst>
+                                    <p:cond delay="0"/>
+                                  </p:stCondLst>
+                                  <p:childTnLst>
+                                    <p:set>
+                                      <p:cBhvr>
+                                        <p:cTn id="30" dur="1" fill="hold">
+                                          <p:stCondLst>
+                                            <p:cond delay="0"/>
+                                          </p:stCondLst>
+                                        </p:cTn>
+                                        <p:tgtEl>
+                                          <p:spTgt spid="3">
+                                            <p:txEl>
                                               <p:pRg st="6" end="6"/>
+                                            </p:txEl>
+                                          </p:spTgt>
+                                        </p:tgtEl>
+                                        <p:attrNameLst>
+                                          <p:attrName>style.visibility</p:attrName>
+                                        </p:attrNameLst>
+                                      </p:cBhvr>
+                                      <p:to>
+                                        <p:strVal val="visible"/>
+                                      </p:to>
+                                    </p:set>
+                                  </p:childTnLst>
+                                </p:cTn>
+                              </p:par>
+                            </p:childTnLst>
+                          </p:cTn>
+                        </p:par>
+                      </p:childTnLst>
+                    </p:cTn>
+                  </p:par>
+                  <p:par>
+                    <p:cTn id="31" fill="hold">
+                      <p:stCondLst>
+                        <p:cond delay="indefinite"/>
+                      </p:stCondLst>
+                      <p:childTnLst>
+                        <p:par>
+                          <p:cTn id="32" fill="hold">
+                            <p:stCondLst>
+                              <p:cond delay="0"/>
+                            </p:stCondLst>
+                            <p:childTnLst>
+                              <p:par>
+                                <p:cTn id="33" presetID="1" presetClass="entr" presetSubtype="0" fill="hold" nodeType="clickEffect">
+                                  <p:stCondLst>
+                                    <p:cond delay="0"/>
+                                  </p:stCondLst>
+                                  <p:childTnLst>
+                                    <p:set>
+                                      <p:cBhvr>
+                                        <p:cTn id="34" dur="1" fill="hold">
+                                          <p:stCondLst>
+                                            <p:cond delay="0"/>
+                                          </p:stCondLst>
+                                        </p:cTn>
+                                        <p:tgtEl>
+                                          <p:spTgt spid="3">
+                                            <p:txEl>
+                                              <p:pRg st="7" end="7"/>
+                                            </p:txEl>
+                                          </p:spTgt>
+                                        </p:tgtEl>
+                                        <p:attrNameLst>
+                                          <p:attrName>style.visibility</p:attrName>
+                                        </p:attrNameLst>
+                                      </p:cBhvr>
+                                      <p:to>
+                                        <p:strVal val="visible"/>
+                                      </p:to>
+                                    </p:set>
+                                  </p:childTnLst>
+                                </p:cTn>
+                              </p:par>
+                            </p:childTnLst>
+                          </p:cTn>
+                        </p:par>
+                      </p:childTnLst>
+                    </p:cTn>
+                  </p:par>
+                  <p:par>
+                    <p:cTn id="35" fill="hold">
+                      <p:stCondLst>
+                        <p:cond delay="indefinite"/>
+                      </p:stCondLst>
+                      <p:childTnLst>
+                        <p:par>
+                          <p:cTn id="36" fill="hold">
+                            <p:stCondLst>
+                              <p:cond delay="0"/>
+                            </p:stCondLst>
+                            <p:childTnLst>
+                              <p:par>
+                                <p:cTn id="37" presetID="1" presetClass="entr" presetSubtype="0" fill="hold" nodeType="clickEffect">
+                                  <p:stCondLst>
+                                    <p:cond delay="0"/>
+                                  </p:stCondLst>
+                                  <p:childTnLst>
+                                    <p:set>
+                                      <p:cBhvr>
+                                        <p:cTn id="38" dur="1" fill="hold">
+                                          <p:stCondLst>
+                                            <p:cond delay="0"/>
+                                          </p:stCondLst>
+                                        </p:cTn>
+                                        <p:tgtEl>
+                                          <p:spTgt spid="3">
+                                            <p:txEl>
+                                              <p:pRg st="8" end="8"/>
+                                            </p:txEl>
+                                          </p:spTgt>
+                                        </p:tgtEl>
+                                        <p:attrNameLst>
+                                          <p:attrName>style.visibility</p:attrName>
+                                        </p:attrNameLst>
+                                      </p:cBhvr>
+                                      <p:to>
+                                        <p:strVal val="visible"/>
+                                      </p:to>
+                                    </p:set>
+                                  </p:childTnLst>
+                                </p:cTn>
+                              </p:par>
+                            </p:childTnLst>
+                          </p:cTn>
+                        </p:par>
+                      </p:childTnLst>
+                    </p:cTn>
+                  </p:par>
+                </p:childTnLst>
+              </p:cTn>
+              <p:prevCondLst>
+                <p:cond evt="onPrev" delay="0">
+                  <p:tgtEl>
+                    <p:sldTgt/>
+                  </p:tgtEl>
+                </p:cond>
+              </p:prevCondLst>
+              <p:nextCondLst>
+                <p:cond evt="onNext" delay="0">
+                  <p:tgtEl>
+                    <p:sldTgt/>
+                  </p:tgtEl>
+                </p:cond>
+              </p:nextCondLst>
+            </p:seq>
+          </p:childTnLst>
+        </p:cTn>
+      </p:par>
+    </p:tnLst>
+  </p:timing>
+</p:sld>
+</file>
+
+<file path=ppt/slides/slide9.xml><?xml version="1.0" encoding="utf-8"?>
+<p:sld xmlns:a="http://schemas.openxmlformats.org/drawingml/2006/main" xmlns:r="http://schemas.openxmlformats.org/officeDocument/2006/relationships" xmlns:p="http://schemas.openxmlformats.org/presentationml/2006/main">
+  <p:cSld>
+    <p:spTree>
+      <p:nvGrpSpPr>
+        <p:cNvPr id="1" name=""/>
+        <p:cNvGrpSpPr/>
+        <p:nvPr/>
+      </p:nvGrpSpPr>
+      <p:grpSpPr>
+        <a:xfrm>
+          <a:off x="0" y="0"/>
+          <a:ext cx="0" cy="0"/>
+          <a:chOff x="0" y="0"/>
+          <a:chExt cx="0" cy="0"/>
+        </a:xfrm>
+      </p:grpSpPr>
+      <p:sp>
+        <p:nvSpPr>
+          <p:cNvPr id="2" name="Title 1">
+            <a:extLst>
+              <a:ext uri="{FF2B5EF4-FFF2-40B4-BE49-F238E27FC236}">
+                <a16:creationId xmlns:a16="http://schemas.microsoft.com/office/drawing/2014/main" id="{FD7CE06F-62DF-0A4F-9228-DE916554C4C1}"/>
+              </a:ext>
+            </a:extLst>
+          </p:cNvPr>
+          <p:cNvSpPr>
+            <a:spLocks noGrp="1"/>
+          </p:cNvSpPr>
+          <p:nvPr>
+            <p:ph type="title"/>
+          </p:nvPr>
+        </p:nvSpPr>
+        <p:spPr/>
+        <p:txBody>
+          <a:bodyPr/>
+          <a:lstStyle/>
+          <a:p>
+            <a:r>
+              <a:rPr lang="en-US" dirty="0"/>
+              <a:t>Future: hardware and software for wireless</a:t>
+            </a:r>
+          </a:p>
+        </p:txBody>
+      </p:sp>
+      <p:sp>
+        <p:nvSpPr>
+          <p:cNvPr id="3" name="Content Placeholder 2">
+            <a:extLst>
+              <a:ext uri="{FF2B5EF4-FFF2-40B4-BE49-F238E27FC236}">
+                <a16:creationId xmlns:a16="http://schemas.microsoft.com/office/drawing/2014/main" id="{54374817-F5D6-504F-A641-4E4AA613C3E8}"/>
+              </a:ext>
+            </a:extLst>
+          </p:cNvPr>
+          <p:cNvSpPr>
+            <a:spLocks noGrp="1"/>
+          </p:cNvSpPr>
+          <p:nvPr>
+            <p:ph idx="1"/>
+          </p:nvPr>
+        </p:nvSpPr>
+        <p:spPr/>
+        <p:txBody>
+          <a:bodyPr/>
+          <a:lstStyle/>
+          <a:p>
+            <a:r>
+              <a:rPr lang="en-US" dirty="0"/>
+              <a:t>Designing hardware accelerators for emerging technologies (e.g., 5G)</a:t>
+            </a:r>
+          </a:p>
+          <a:p>
+            <a:pPr lvl="1"/>
+            <a:r>
+              <a:rPr lang="en-US" dirty="0"/>
+              <a:t>Splitting the wireless stack between a host processor and an accelerator/FPGA</a:t>
+            </a:r>
+          </a:p>
+          <a:p>
+            <a:pPr lvl="1"/>
+            <a:endParaRPr lang="en-US" dirty="0"/>
+          </a:p>
+          <a:p>
+            <a:r>
+              <a:rPr lang="en-US" dirty="0"/>
+              <a:t>Programmability for the evolved packet core</a:t>
+            </a:r>
+          </a:p>
+          <a:p>
+            <a:endParaRPr lang="en-US" dirty="0"/>
+          </a:p>
+        </p:txBody>
+      </p:sp>
+    </p:spTree>
+    <p:extLst>
+      <p:ext uri="{BB962C8B-B14F-4D97-AF65-F5344CB8AC3E}">
+        <p14:creationId xmlns:p14="http://schemas.microsoft.com/office/powerpoint/2010/main" val="2570343695"/>
+      </p:ext>
+    </p:extLst>
+  </p:cSld>
+  <p:clrMapOvr>
+    <a:masterClrMapping/>
+  </p:clrMapOvr>
+  <p:timing>
+    <p:tnLst>
+      <p:par>
+        <p:cTn id="1" dur="indefinite" restart="never" nodeType="tmRoot">
+          <p:childTnLst>
+            <p:seq concurrent="1" nextAc="seek">
+              <p:cTn id="2" dur="indefinite" nodeType="mainSeq">
+                <p:childTnLst>
+                  <p:par>
+                    <p:cTn id="3" fill="hold">
+                      <p:stCondLst>
+                        <p:cond delay="indefinite"/>
+                      </p:stCondLst>
+                      <p:childTnLst>
+                        <p:par>
+                          <p:cTn id="4" fill="hold">
+                            <p:stCondLst>
+                              <p:cond delay="0"/>
+                            </p:stCondLst>
+                            <p:childTnLst>
+                              <p:par>
+                                <p:cTn id="5" presetID="1" presetClass="entr" presetSubtype="0" fill="hold" nodeType="clickEffect">
+                                  <p:stCondLst>
+                                    <p:cond delay="0"/>
+                                  </p:stCondLst>
+                                  <p:childTnLst>
+                                    <p:set>
+                                      <p:cBhvr>
+                                        <p:cTn id="6" dur="1" fill="hold">
+                                          <p:stCondLst>
+                                            <p:cond delay="0"/>
+                                          </p:stCondLst>
+                                        </p:cTn>
+                                        <p:tgtEl>
+                                          <p:spTgt spid="3">
+                                            <p:txEl>
+                                              <p:pRg st="0" end="0"/>
+                                            </p:txEl>
+                                          </p:spTgt>
+                                        </p:tgtEl>
+                                        <p:attrNameLst>
+                                          <p:attrName>style.visibility</p:attrName>
+                                        </p:attrNameLst>
+                                      </p:cBhvr>
+                                      <p:to>
+                                        <p:strVal val="visible"/>
+                                      </p:to>
+                                    </p:set>
+                                  </p:childTnLst>
+                                </p:cTn>
+                              </p:par>
+                            </p:childTnLst>
+                          </p:cTn>
+                        </p:par>
+                      </p:childTnLst>
+                    </p:cTn>
+                  </p:par>
+                  <p:par>
+                    <p:cTn id="7" fill="hold">
+                      <p:stCondLst>
+                        <p:cond delay="indefinite"/>
+                      </p:stCondLst>
+                      <p:childTnLst>
+                        <p:par>
+                          <p:cTn id="8" fill="hold">
+                            <p:stCondLst>
+                              <p:cond delay="0"/>
+                            </p:stCondLst>
+                            <p:childTnLst>
+                              <p:par>
+                                <p:cTn id="9" presetID="1" presetClass="entr" presetSubtype="0" fill="hold" nodeType="clickEffect">
+                                  <p:stCondLst>
+                                    <p:cond delay="0"/>
+                                  </p:stCondLst>
+                                  <p:childTnLst>
+                                    <p:set>
+                                      <p:cBhvr>
+                                        <p:cTn id="10" dur="1" fill="hold">
+                                          <p:stCondLst>
+                                            <p:cond delay="0"/>
+                                          </p:stCondLst>
+                                        </p:cTn>
+                                        <p:tgtEl>
+                                          <p:spTgt spid="3">
+                                            <p:txEl>
+                                              <p:pRg st="1" end="1"/>
+                                            </p:txEl>
+                                          </p:spTgt>
+                                        </p:tgtEl>
+                                        <p:attrNameLst>
+                                          <p:attrName>style.visibility</p:attrName>
+                                        </p:attrNameLst>
+                                      </p:cBhvr>
+                                      <p:to>
+                                        <p:strVal val="visible"/>
+                                      </p:to>
+                                    </p:set>
+                                  </p:childTnLst>
+                                </p:cTn>
+                              </p:par>
+                            </p:childTnLst>
+                          </p:cTn>
+                        </p:par>
+                      </p:childTnLst>
+                    </p:cTn>
+                  </p:par>
+                  <p:par>
+                    <p:cTn id="11" fill="hold">
+                      <p:stCondLst>
+                        <p:cond delay="indefinite"/>
+                      </p:stCondLst>
+                      <p:childTnLst>
+                        <p:par>
+                          <p:cTn id="12" fill="hold">
+                            <p:stCondLst>
+                              <p:cond delay="0"/>
+                            </p:stCondLst>
+                            <p:childTnLst>
+                              <p:par>
+                                <p:cTn id="13" presetID="1" presetClass="entr" presetSubtype="0" fill="hold" nodeType="clickEffect">
+                                  <p:stCondLst>
+                                    <p:cond delay="0"/>
+                                  </p:stCondLst>
+                                  <p:childTnLst>
+                                    <p:set>
+                                      <p:cBhvr>
+                                        <p:cTn id="14" dur="1" fill="hold">
+                                          <p:stCondLst>
+                                            <p:cond delay="0"/>
+                                          </p:stCondLst>
+                                        </p:cTn>
+                                        <p:tgtEl>
+                                          <p:spTgt spid="3">
+                                            <p:txEl>
+                                              <p:pRg st="3" end="3"/>
                                             </p:txEl>
                                           </p:spTgt>
                                         </p:tgtEl>

</xml_diff>

<commit_message>
Remove some stale notes.
</commit_message>
<xml_diff>
--- a/nyu_wireless_anirudh.pptx
+++ b/nyu_wireless_anirudh.pptx
@@ -1216,145 +1216,6 @@
         <p:txBody>
           <a:bodyPr/>
           <a:lstStyle/>
-          <a:p>
-            <a:pPr marL="228600" marR="0" lvl="0" indent="-228600" algn="l" defTabSz="914400" rtl="0" eaLnBrk="1" fontAlgn="auto" latinLnBrk="0" hangingPunct="1">
-              <a:lnSpc>
-                <a:spcPct val="100000"/>
-              </a:lnSpc>
-              <a:spcBef>
-                <a:spcPts val="0"/>
-              </a:spcBef>
-              <a:spcAft>
-                <a:spcPts val="0"/>
-              </a:spcAft>
-              <a:buClrTx/>
-              <a:buSzTx/>
-              <a:buFontTx/>
-              <a:buAutoNum type="arabicPeriod"/>
-              <a:tabLst/>
-              <a:defRPr/>
-            </a:pPr>
-            <a:r>
-              <a:rPr lang="en-US" dirty="0"/>
-              <a:t>Router vendors: Can now design routers in firmware, easier to fix bugs, easier to respond to customer requests</a:t>
-            </a:r>
-          </a:p>
-          <a:p>
-            <a:pPr marL="228600" marR="0" lvl="0" indent="-228600" algn="l" defTabSz="914400" rtl="0" eaLnBrk="1" fontAlgn="auto" latinLnBrk="0" hangingPunct="1">
-              <a:lnSpc>
-                <a:spcPct val="100000"/>
-              </a:lnSpc>
-              <a:spcBef>
-                <a:spcPts val="0"/>
-              </a:spcBef>
-              <a:spcAft>
-                <a:spcPts val="0"/>
-              </a:spcAft>
-              <a:buClrTx/>
-              <a:buSzTx/>
-              <a:buFontTx/>
-              <a:buAutoNum type="arabicPeriod"/>
-              <a:tabLst/>
-              <a:defRPr/>
-            </a:pPr>
-            <a:r>
-              <a:rPr lang="en-US" dirty="0"/>
-              <a:t>Network operators (e.g., Google, Microsoft, enterprises etc.): Can add features without haggling with ASIC vendor</a:t>
-            </a:r>
-          </a:p>
-          <a:p>
-            <a:pPr marL="228600" marR="0" lvl="0" indent="-228600" algn="l" defTabSz="914400" rtl="0" eaLnBrk="1" fontAlgn="auto" latinLnBrk="0" hangingPunct="1">
-              <a:lnSpc>
-                <a:spcPct val="100000"/>
-              </a:lnSpc>
-              <a:spcBef>
-                <a:spcPts val="0"/>
-              </a:spcBef>
-              <a:spcAft>
-                <a:spcPts val="0"/>
-              </a:spcAft>
-              <a:buClrTx/>
-              <a:buSzTx/>
-              <a:buFontTx/>
-              <a:buAutoNum type="arabicPeriod"/>
-              <a:tabLst/>
-              <a:defRPr/>
-            </a:pPr>
-            <a:endParaRPr lang="en-US" dirty="0"/>
-          </a:p>
-          <a:p>
-            <a:pPr marL="228600" marR="0" lvl="0" indent="-228600" algn="l" defTabSz="914400" rtl="0" eaLnBrk="1" fontAlgn="auto" latinLnBrk="0" hangingPunct="1">
-              <a:lnSpc>
-                <a:spcPct val="100000"/>
-              </a:lnSpc>
-              <a:spcBef>
-                <a:spcPts val="0"/>
-              </a:spcBef>
-              <a:spcAft>
-                <a:spcPts val="0"/>
-              </a:spcAft>
-              <a:buClrTx/>
-              <a:buSzTx/>
-              <a:buFontTx/>
-              <a:buAutoNum type="arabicPeriod"/>
-              <a:tabLst/>
-              <a:defRPr/>
-            </a:pPr>
-            <a:r>
-              <a:rPr lang="en-US" dirty="0"/>
-              <a:t>Stress that programmability and configurability are really not all that different.. Richer configurability is already happening. Programmability is the logical next step because it simplifies your chip, makes it future proof, which is especially important in an era of rising silicon mask costs. P4 may not be the final word on router programmability. It may not all be portable either. But I think the current generation of fixed-function router SDKs will be replaced by richer, more programmable DSLs for routers like what CUDA did for GPUs.</a:t>
-            </a:r>
-          </a:p>
-          <a:p>
-            <a:pPr marL="228600" marR="0" lvl="0" indent="-228600" algn="l" defTabSz="914400" rtl="0" eaLnBrk="1" fontAlgn="auto" latinLnBrk="0" hangingPunct="1">
-              <a:lnSpc>
-                <a:spcPct val="100000"/>
-              </a:lnSpc>
-              <a:spcBef>
-                <a:spcPts val="0"/>
-              </a:spcBef>
-              <a:spcAft>
-                <a:spcPts val="0"/>
-              </a:spcAft>
-              <a:buClrTx/>
-              <a:buSzTx/>
-              <a:buFontTx/>
-              <a:buAutoNum type="arabicPeriod"/>
-              <a:tabLst/>
-              <a:defRPr/>
-            </a:pPr>
-            <a:endParaRPr lang="en-US" dirty="0"/>
-          </a:p>
-          <a:p>
-            <a:pPr marL="228600" marR="0" lvl="0" indent="-228600" algn="l" defTabSz="914400" rtl="0" eaLnBrk="1" fontAlgn="auto" latinLnBrk="0" hangingPunct="1">
-              <a:lnSpc>
-                <a:spcPct val="100000"/>
-              </a:lnSpc>
-              <a:spcBef>
-                <a:spcPts val="0"/>
-              </a:spcBef>
-              <a:spcAft>
-                <a:spcPts val="0"/>
-              </a:spcAft>
-              <a:buClrTx/>
-              <a:buSzTx/>
-              <a:buFontTx/>
-              <a:buAutoNum type="arabicPeriod"/>
-              <a:tabLst/>
-              <a:defRPr/>
-            </a:pPr>
-            <a:r>
-              <a:rPr lang="en-US" dirty="0"/>
-              <a:t>Future work:</a:t>
-            </a:r>
-          </a:p>
-          <a:p>
-            <a:pPr lvl="1"/>
-            <a:r>
-              <a:rPr lang="en-US" dirty="0"/>
-              <a:t>Costs and benefits of a network with enhanced network functionality?</a:t>
-            </a:r>
-          </a:p>
           <a:p>
             <a:endParaRPr lang="en-US" dirty="0"/>
           </a:p>

</xml_diff>

<commit_message>
Remove some old notes.
</commit_message>
<xml_diff>
--- a/nyu_wireless_anirudh.pptx
+++ b/nyu_wireless_anirudh.pptx
@@ -1035,10 +1035,7 @@
               <a:tabLst/>
               <a:defRPr/>
             </a:pPr>
-            <a:r>
-              <a:rPr lang="en-US" baseline="0" dirty="0"/>
-              <a:t>I’ll discuss two pieces of work: Domino to run on the pipelines and PIFO to run on the scheduler.</a:t>
-            </a:r>
+            <a:endParaRPr lang="en-US" baseline="0" dirty="0"/>
           </a:p>
         </p:txBody>
       </p:sp>
@@ -1125,14 +1122,6 @@
             <a:pPr marL="228600" indent="-228600">
               <a:buAutoNum type="arabicPeriod"/>
             </a:pPr>
-            <a:r>
-              <a:rPr lang="en-US" baseline="0" dirty="0"/>
-              <a:t>Skip </a:t>
-            </a:r>
-            <a:r>
-              <a:rPr lang="en-US" baseline="0"/>
-              <a:t>if required.</a:t>
-            </a:r>
             <a:endParaRPr lang="en-US" baseline="0" dirty="0"/>
           </a:p>
         </p:txBody>

</xml_diff>